<commit_message>
Add executive summary slides of Keylime
</commit_message>
<xml_diff>
--- a/doc/keylime-elevator-slides.pptx
+++ b/doc/keylime-elevator-slides.pptx
@@ -471,7 +471,7 @@
             <a:fld id="{2151C11E-1A00-48AF-8C08-97C362C67874}" type="datetimeFigureOut">
               <a:rPr lang="en-US" smtClean="0"/>
               <a:pPr/>
-              <a:t>5/4/18</a:t>
+              <a:t>5/11/18</a:t>
             </a:fld>
             <a:endParaRPr lang="en-US" dirty="0"/>
           </a:p>
@@ -642,7 +642,7 @@
             <a:fld id="{8C7BB64C-82E2-466C-9C50-B2DA6307AB11}" type="datetimeFigureOut">
               <a:rPr lang="en-US" smtClean="0"/>
               <a:pPr/>
-              <a:t>5/4/18</a:t>
+              <a:t>5/11/18</a:t>
             </a:fld>
             <a:endParaRPr lang="en-US" dirty="0"/>
           </a:p>
@@ -3468,12 +3468,6 @@
           <a:p>
             <a:r>
               <a:rPr lang="en-US" dirty="0"/>
-              <a:t>Charles Munson and Nabil Schear</a:t>
-            </a:r>
-          </a:p>
-          <a:p>
-            <a:r>
-              <a:rPr lang="en-US" dirty="0"/>
               <a:t>Executive Summary</a:t>
             </a:r>
           </a:p>
@@ -3481,6 +3475,20 @@
             <a:r>
               <a:rPr lang="en-US" dirty="0"/>
               <a:t>5 May 2018</a:t>
+            </a:r>
+          </a:p>
+          <a:p>
+            <a:r>
+              <a:rPr lang="en-US" sz="1800" dirty="0"/>
+              <a:t>POC: Nabil </a:t>
+            </a:r>
+            <a:r>
+              <a:rPr lang="en-US" sz="1800" dirty="0" err="1"/>
+              <a:t>Schear</a:t>
+            </a:r>
+            <a:r>
+              <a:rPr lang="en-US" sz="1800" dirty="0"/>
+              <a:t>, Charles Munson </a:t>
             </a:r>
           </a:p>
         </p:txBody>
@@ -3513,7 +3521,7 @@
               <a:rPr lang="en-US" dirty="0"/>
             </a:br>
             <a:r>
-              <a:rPr lang="en-US" sz="2800" dirty="0"/>
+              <a:rPr lang="en-US" sz="2800" i="1" dirty="0"/>
               <a:t>Trust in the Cloud</a:t>
             </a:r>
           </a:p>

</xml_diff>